<commit_message>
Content for session 93
</commit_message>
<xml_diff>
--- a/Source/Cooking With CQL/93/July CMS Connectathon Announcement Outreach.pptx
+++ b/Source/Cooking With CQL/93/July CMS Connectathon Announcement Outreach.pptx
@@ -5,7 +5,7 @@
     <p:sldMasterId id="2147483648" r:id="rId4"/>
   </p:sldMasterIdLst>
   <p:notesMasterIdLst>
-    <p:notesMasterId r:id="rId12"/>
+    <p:notesMasterId r:id="rId13"/>
   </p:notesMasterIdLst>
   <p:sldIdLst>
     <p:sldId id="593" r:id="rId5"/>
@@ -14,7 +14,8 @@
     <p:sldId id="4857" r:id="rId8"/>
     <p:sldId id="263" r:id="rId9"/>
     <p:sldId id="4859" r:id="rId10"/>
-    <p:sldId id="594" r:id="rId11"/>
+    <p:sldId id="4871" r:id="rId11"/>
+    <p:sldId id="594" r:id="rId12"/>
   </p:sldIdLst>
   <p:sldSz cx="14630400" cy="8229600"/>
   <p:notesSz cx="7010400" cy="9296400"/>
@@ -408,7 +409,7 @@
       </p15:sldGuideLst>
     </p:ext>
     <p:ext uri="http://customooxmlschemas.google.com/">
-      <go:slidesCustomData xmlns="" xmlns:mc="http://schemas.openxmlformats.org/markup-compatibility/2006" xmlns:mv="urn:schemas-microsoft-com:mac:vml" xmlns:c="http://schemas.openxmlformats.org/drawingml/2006/chart" xmlns:dgm="http://schemas.openxmlformats.org/drawingml/2006/diagram" xmlns:o="urn:schemas-microsoft-com:office:office" xmlns:v="urn:schemas-microsoft-com:vml" xmlns:pvml="urn:schemas-microsoft-com:office:powerpoint" xmlns:com="http://schemas.openxmlformats.org/drawingml/2006/compatibility" xmlns:p14="http://schemas.microsoft.com/office/powerpoint/2010/main" xmlns:p15="http://schemas.microsoft.com/office/powerpoint/2012/main" xmlns:ahyp="http://schemas.microsoft.com/office/drawing/2018/hyperlinkcolor" xmlns:go="http://customooxmlschemas.google.com/" r:id="rId33" roundtripDataSignature="AMtx7mjMqumK7D2atV2S+fHTNn43r/B9RA=="/>
+      <go:slidesCustomData xmlns:go="http://customooxmlschemas.google.com/" xmlns:ahyp="http://schemas.microsoft.com/office/drawing/2018/hyperlinkcolor" xmlns:p15="http://schemas.microsoft.com/office/powerpoint/2012/main" xmlns:p14="http://schemas.microsoft.com/office/powerpoint/2010/main" xmlns:com="http://schemas.openxmlformats.org/drawingml/2006/compatibility" xmlns:pvml="urn:schemas-microsoft-com:office:powerpoint" xmlns:v="urn:schemas-microsoft-com:vml" xmlns:o="urn:schemas-microsoft-com:office:office" xmlns:dgm="http://schemas.openxmlformats.org/drawingml/2006/diagram" xmlns:c="http://schemas.openxmlformats.org/drawingml/2006/chart" xmlns:mv="urn:schemas-microsoft-com:mac:vml" xmlns:mc="http://schemas.openxmlformats.org/markup-compatibility/2006" xmlns="" r:id="rId33" roundtripDataSignature="AMtx7mjMqumK7D2atV2S+fHTNn43r/B9RA=="/>
     </p:ext>
   </p:extLst>
 </p:presentation>
@@ -44570,6 +44571,124 @@
   <p:cSld>
     <p:spTree>
       <p:nvGrpSpPr>
+        <p:cNvPr id="1" name=""/>
+        <p:cNvGrpSpPr/>
+        <p:nvPr/>
+      </p:nvGrpSpPr>
+      <p:grpSpPr>
+        <a:xfrm>
+          <a:off x="0" y="0"/>
+          <a:ext cx="0" cy="0"/>
+          <a:chOff x="0" y="0"/>
+          <a:chExt cx="0" cy="0"/>
+        </a:xfrm>
+      </p:grpSpPr>
+      <p:sp>
+        <p:nvSpPr>
+          <p:cNvPr id="2" name="Title 1">
+            <a:extLst>
+              <a:ext uri="{FF2B5EF4-FFF2-40B4-BE49-F238E27FC236}">
+                <a16:creationId xmlns:a16="http://schemas.microsoft.com/office/drawing/2014/main" id="{8CB130B7-2129-3A28-C1F4-9EAEC7C79FB3}"/>
+              </a:ext>
+            </a:extLst>
+          </p:cNvPr>
+          <p:cNvSpPr>
+            <a:spLocks noGrp="1"/>
+          </p:cNvSpPr>
+          <p:nvPr>
+            <p:ph type="title"/>
+          </p:nvPr>
+        </p:nvSpPr>
+        <p:spPr/>
+        <p:txBody>
+          <a:bodyPr/>
+          <a:lstStyle/>
+          <a:p>
+            <a:r>
+              <a:rPr lang="en-US" dirty="0"/>
+              <a:t>Final Track Schedule</a:t>
+            </a:r>
+          </a:p>
+        </p:txBody>
+      </p:sp>
+      <p:sp>
+        <p:nvSpPr>
+          <p:cNvPr id="4" name="Slide Number Placeholder 3">
+            <a:extLst>
+              <a:ext uri="{FF2B5EF4-FFF2-40B4-BE49-F238E27FC236}">
+                <a16:creationId xmlns:a16="http://schemas.microsoft.com/office/drawing/2014/main" id="{203FA75A-789F-0DD1-ADE8-63B6CB88D03A}"/>
+              </a:ext>
+            </a:extLst>
+          </p:cNvPr>
+          <p:cNvSpPr>
+            <a:spLocks noGrp="1"/>
+          </p:cNvSpPr>
+          <p:nvPr>
+            <p:ph type="sldNum" idx="12"/>
+          </p:nvPr>
+        </p:nvSpPr>
+        <p:spPr/>
+        <p:txBody>
+          <a:bodyPr/>
+          <a:lstStyle/>
+          <a:p>
+            <a:fld id="{00000000-1234-1234-1234-123412341234}" type="slidenum">
+              <a:rPr lang="en-US" smtClean="0"/>
+              <a:pPr/>
+              <a:t>7</a:t>
+            </a:fld>
+            <a:endParaRPr lang="en-US" dirty="0"/>
+          </a:p>
+        </p:txBody>
+      </p:sp>
+      <p:pic>
+        <p:nvPicPr>
+          <p:cNvPr id="5" name="Picture 4" descr="A screenshot of a computer&#10;&#10;AI-generated content may be incorrect.">
+            <a:extLst>
+              <a:ext uri="{FF2B5EF4-FFF2-40B4-BE49-F238E27FC236}">
+                <a16:creationId xmlns:a16="http://schemas.microsoft.com/office/drawing/2014/main" id="{7207919E-3FD1-6568-3CE4-0F840DC24271}"/>
+              </a:ext>
+            </a:extLst>
+          </p:cNvPr>
+          <p:cNvPicPr>
+            <a:picLocks noChangeAspect="1"/>
+          </p:cNvPicPr>
+          <p:nvPr/>
+        </p:nvPicPr>
+        <p:blipFill>
+          <a:blip r:embed="rId2"/>
+          <a:stretch>
+            <a:fillRect/>
+          </a:stretch>
+        </p:blipFill>
+        <p:spPr>
+          <a:xfrm>
+            <a:off x="1082815" y="1215068"/>
+            <a:ext cx="12565750" cy="6157614"/>
+          </a:xfrm>
+          <a:prstGeom prst="rect">
+            <a:avLst/>
+          </a:prstGeom>
+        </p:spPr>
+      </p:pic>
+    </p:spTree>
+    <p:extLst>
+      <p:ext uri="{BB962C8B-B14F-4D97-AF65-F5344CB8AC3E}">
+        <p14:creationId xmlns:p14="http://schemas.microsoft.com/office/powerpoint/2010/main" val="1086131938"/>
+      </p:ext>
+    </p:extLst>
+  </p:cSld>
+  <p:clrMapOvr>
+    <a:masterClrMapping/>
+  </p:clrMapOvr>
+</p:sld>
+</file>
+
+<file path=ppt/slides/slide8.xml><?xml version="1.0" encoding="utf-8"?>
+<p:sld xmlns:a="http://schemas.openxmlformats.org/drawingml/2006/main" xmlns:r="http://schemas.openxmlformats.org/officeDocument/2006/relationships" xmlns:p="http://schemas.openxmlformats.org/presentationml/2006/main">
+  <p:cSld>
+    <p:spTree>
+      <p:nvGrpSpPr>
         <p:cNvPr id="1" name="Shape 321">
           <a:extLst>
             <a:ext uri="{FF2B5EF4-FFF2-40B4-BE49-F238E27FC236}">
@@ -44818,7 +44937,7 @@
             </a:pPr>
             <a:fld id="{00000000-1234-1234-1234-123412341234}" type="slidenum">
               <a:rPr lang="en-US"/>
-              <a:t>7</a:t>
+              <a:t>8</a:t>
             </a:fld>
             <a:endParaRPr dirty="0"/>
           </a:p>
@@ -45429,6 +45548,15 @@
 </file>
 
 <file path=customXml/item2.xml><?xml version="1.0" encoding="utf-8"?>
+<?mso-contentType ?>
+<FormTemplates xmlns="http://schemas.microsoft.com/sharepoint/v3/contenttype/forms">
+  <Display>DocumentLibraryForm</Display>
+  <Edit>DocumentLibraryForm</Edit>
+  <New>DocumentLibraryForm</New>
+</FormTemplates>
+</file>
+
+<file path=customXml/item3.xml><?xml version="1.0" encoding="utf-8"?>
 <ct:contentTypeSchema xmlns:ct="http://schemas.microsoft.com/office/2006/metadata/contentType" xmlns:ma="http://schemas.microsoft.com/office/2006/metadata/properties/metaAttributes" ct:_="" ma:_="" ma:contentTypeName="Document" ma:contentTypeID="0x01010098C137BADBF78A49992E0B577711A797" ma:contentTypeVersion="17" ma:contentTypeDescription="Create a new document." ma:contentTypeScope="" ma:versionID="0e16e468b7f6315827058c56e703890f">
   <xsd:schema xmlns:xsd="http://www.w3.org/2001/XMLSchema" xmlns:xs="http://www.w3.org/2001/XMLSchema" xmlns:p="http://schemas.microsoft.com/office/2006/metadata/properties" xmlns:ns2="ee760227-5363-409a-a2c4-5259cd9496dc" xmlns:ns3="7b40dade-9a21-4c5b-8fc8-7ce30e2381ad" xmlns:ns4="fa6a9aea-fb0f-4ddd-aff8-712634b7d5fe" targetNamespace="http://schemas.microsoft.com/office/2006/metadata/properties" ma:root="true" ma:fieldsID="e984ecb132d2def81bd89b5fe683e9d7" ns2:_="" ns3:_="" ns4:_="">
     <xsd:import namespace="ee760227-5363-409a-a2c4-5259cd9496dc"/>
@@ -45684,15 +45812,6 @@
 </ct:contentTypeSchema>
 </file>
 
-<file path=customXml/item3.xml><?xml version="1.0" encoding="utf-8"?>
-<?mso-contentType ?>
-<FormTemplates xmlns="http://schemas.microsoft.com/sharepoint/v3/contenttype/forms">
-  <Display>DocumentLibraryForm</Display>
-  <Edit>DocumentLibraryForm</Edit>
-  <New>DocumentLibraryForm</New>
-</FormTemplates>
-</file>
-
 <file path=customXml/itemProps1.xml><?xml version="1.0" encoding="utf-8"?>
 <ds:datastoreItem xmlns:ds="http://schemas.openxmlformats.org/officeDocument/2006/customXml" ds:itemID="{8355AC57-15AF-4844-953F-810C2DBDD6D9}">
   <ds:schemaRefs>
@@ -45706,6 +45825,14 @@
 </file>
 
 <file path=customXml/itemProps2.xml><?xml version="1.0" encoding="utf-8"?>
+<ds:datastoreItem xmlns:ds="http://schemas.openxmlformats.org/officeDocument/2006/customXml" ds:itemID="{A2524769-F636-4DB2-A693-2C634FB3EAE0}">
+  <ds:schemaRefs>
+    <ds:schemaRef ds:uri="http://schemas.microsoft.com/sharepoint/v3/contenttype/forms"/>
+  </ds:schemaRefs>
+</ds:datastoreItem>
+</file>
+
+<file path=customXml/itemProps3.xml><?xml version="1.0" encoding="utf-8"?>
 <ds:datastoreItem xmlns:ds="http://schemas.openxmlformats.org/officeDocument/2006/customXml" ds:itemID="{BBFB2E98-13BC-4177-B971-37CB58765215}">
   <ds:schemaRefs>
     <ds:schemaRef ds:uri="http://schemas.microsoft.com/office/2006/metadata/contentType"/>
@@ -45725,14 +45852,6 @@
 </ds:datastoreItem>
 </file>
 
-<file path=customXml/itemProps3.xml><?xml version="1.0" encoding="utf-8"?>
-<ds:datastoreItem xmlns:ds="http://schemas.openxmlformats.org/officeDocument/2006/customXml" ds:itemID="{A2524769-F636-4DB2-A693-2C634FB3EAE0}">
-  <ds:schemaRefs>
-    <ds:schemaRef ds:uri="http://schemas.microsoft.com/sharepoint/v3/contenttype/forms"/>
-  </ds:schemaRefs>
-</ds:datastoreItem>
-</file>
-
 <file path=docMetadata/LabelInfo.xml><?xml version="1.0" encoding="utf-8"?>
 <clbl:labelList xmlns:clbl="http://schemas.microsoft.com/office/2020/mipLabelMetadata">
   <clbl:label id="{cf90b97b-be46-4a00-9700-81ce4ff1b7f6}" enabled="0" method="" siteId="{cf90b97b-be46-4a00-9700-81ce4ff1b7f6}" removed="1"/>

</xml_diff>